<commit_message>
update schematic with new design (v2.0)
</commit_message>
<xml_diff>
--- a/docs/weekly_report/AIA_w3.pptx
+++ b/docs/weekly_report/AIA_w3.pptx
@@ -5,7 +5,7 @@
     <p:sldMasterId id="2147483648" r:id="rId1"/>
   </p:sldMasterIdLst>
   <p:notesMasterIdLst>
-    <p:notesMasterId r:id="rId17"/>
+    <p:notesMasterId r:id="rId18"/>
   </p:notesMasterIdLst>
   <p:sldIdLst>
     <p:sldId id="256" r:id="rId2"/>
@@ -19,10 +19,11 @@
     <p:sldId id="260" r:id="rId10"/>
     <p:sldId id="261" r:id="rId11"/>
     <p:sldId id="272" r:id="rId12"/>
-    <p:sldId id="262" r:id="rId13"/>
-    <p:sldId id="268" r:id="rId14"/>
-    <p:sldId id="263" r:id="rId15"/>
-    <p:sldId id="265" r:id="rId16"/>
+    <p:sldId id="273" r:id="rId13"/>
+    <p:sldId id="262" r:id="rId14"/>
+    <p:sldId id="268" r:id="rId15"/>
+    <p:sldId id="263" r:id="rId16"/>
+    <p:sldId id="265" r:id="rId17"/>
   </p:sldIdLst>
   <p:sldSz cx="12192000" cy="6858000"/>
   <p:notesSz cx="6858000" cy="9144000"/>
@@ -211,7 +212,7 @@
           <a:p>
             <a:fld id="{F22B30F6-8776-4986-8CEB-B33F3494E024}" type="datetimeFigureOut">
               <a:rPr lang="zh-TW" altLang="en-US" smtClean="0"/>
-              <a:t>2024/8/8</a:t>
+              <a:t>2024/8/9</a:t>
             </a:fld>
             <a:endParaRPr lang="zh-TW" altLang="en-US"/>
           </a:p>
@@ -908,7 +909,7 @@
           <a:p>
             <a:fld id="{584C81F7-5D77-4088-93AA-193310438024}" type="slidenum">
               <a:rPr lang="zh-TW" altLang="en-US" smtClean="0"/>
-              <a:t>15</a:t>
+              <a:t>16</a:t>
             </a:fld>
             <a:endParaRPr lang="zh-TW" altLang="en-US"/>
           </a:p>
@@ -1056,7 +1057,7 @@
           <a:p>
             <a:fld id="{088B5CA7-2AD3-4C1E-AA14-1E537B990F6F}" type="datetimeFigureOut">
               <a:rPr lang="zh-TW" altLang="en-US" smtClean="0"/>
-              <a:t>2024/8/8</a:t>
+              <a:t>2024/8/9</a:t>
             </a:fld>
             <a:endParaRPr lang="zh-TW" altLang="en-US"/>
           </a:p>
@@ -1224,7 +1225,7 @@
           <a:p>
             <a:fld id="{088B5CA7-2AD3-4C1E-AA14-1E537B990F6F}" type="datetimeFigureOut">
               <a:rPr lang="zh-TW" altLang="en-US" smtClean="0"/>
-              <a:t>2024/8/8</a:t>
+              <a:t>2024/8/9</a:t>
             </a:fld>
             <a:endParaRPr lang="zh-TW" altLang="en-US"/>
           </a:p>
@@ -1402,7 +1403,7 @@
           <a:p>
             <a:fld id="{088B5CA7-2AD3-4C1E-AA14-1E537B990F6F}" type="datetimeFigureOut">
               <a:rPr lang="zh-TW" altLang="en-US" smtClean="0"/>
-              <a:t>2024/8/8</a:t>
+              <a:t>2024/8/9</a:t>
             </a:fld>
             <a:endParaRPr lang="zh-TW" altLang="en-US"/>
           </a:p>
@@ -1570,7 +1571,7 @@
           <a:p>
             <a:fld id="{088B5CA7-2AD3-4C1E-AA14-1E537B990F6F}" type="datetimeFigureOut">
               <a:rPr lang="zh-TW" altLang="en-US" smtClean="0"/>
-              <a:t>2024/8/8</a:t>
+              <a:t>2024/8/9</a:t>
             </a:fld>
             <a:endParaRPr lang="zh-TW" altLang="en-US"/>
           </a:p>
@@ -1815,7 +1816,7 @@
           <a:p>
             <a:fld id="{088B5CA7-2AD3-4C1E-AA14-1E537B990F6F}" type="datetimeFigureOut">
               <a:rPr lang="zh-TW" altLang="en-US" smtClean="0"/>
-              <a:t>2024/8/8</a:t>
+              <a:t>2024/8/9</a:t>
             </a:fld>
             <a:endParaRPr lang="zh-TW" altLang="en-US"/>
           </a:p>
@@ -2044,7 +2045,7 @@
           <a:p>
             <a:fld id="{088B5CA7-2AD3-4C1E-AA14-1E537B990F6F}" type="datetimeFigureOut">
               <a:rPr lang="zh-TW" altLang="en-US" smtClean="0"/>
-              <a:t>2024/8/8</a:t>
+              <a:t>2024/8/9</a:t>
             </a:fld>
             <a:endParaRPr lang="zh-TW" altLang="en-US"/>
           </a:p>
@@ -2408,7 +2409,7 @@
           <a:p>
             <a:fld id="{088B5CA7-2AD3-4C1E-AA14-1E537B990F6F}" type="datetimeFigureOut">
               <a:rPr lang="zh-TW" altLang="en-US" smtClean="0"/>
-              <a:t>2024/8/8</a:t>
+              <a:t>2024/8/9</a:t>
             </a:fld>
             <a:endParaRPr lang="zh-TW" altLang="en-US"/>
           </a:p>
@@ -2525,7 +2526,7 @@
           <a:p>
             <a:fld id="{088B5CA7-2AD3-4C1E-AA14-1E537B990F6F}" type="datetimeFigureOut">
               <a:rPr lang="zh-TW" altLang="en-US" smtClean="0"/>
-              <a:t>2024/8/8</a:t>
+              <a:t>2024/8/9</a:t>
             </a:fld>
             <a:endParaRPr lang="zh-TW" altLang="en-US"/>
           </a:p>
@@ -2620,7 +2621,7 @@
           <a:p>
             <a:fld id="{088B5CA7-2AD3-4C1E-AA14-1E537B990F6F}" type="datetimeFigureOut">
               <a:rPr lang="zh-TW" altLang="en-US" smtClean="0"/>
-              <a:t>2024/8/8</a:t>
+              <a:t>2024/8/9</a:t>
             </a:fld>
             <a:endParaRPr lang="zh-TW" altLang="en-US"/>
           </a:p>
@@ -2895,7 +2896,7 @@
           <a:p>
             <a:fld id="{088B5CA7-2AD3-4C1E-AA14-1E537B990F6F}" type="datetimeFigureOut">
               <a:rPr lang="zh-TW" altLang="en-US" smtClean="0"/>
-              <a:t>2024/8/8</a:t>
+              <a:t>2024/8/9</a:t>
             </a:fld>
             <a:endParaRPr lang="zh-TW" altLang="en-US"/>
           </a:p>
@@ -3147,7 +3148,7 @@
           <a:p>
             <a:fld id="{088B5CA7-2AD3-4C1E-AA14-1E537B990F6F}" type="datetimeFigureOut">
               <a:rPr lang="zh-TW" altLang="en-US" smtClean="0"/>
-              <a:t>2024/8/8</a:t>
+              <a:t>2024/8/9</a:t>
             </a:fld>
             <a:endParaRPr lang="zh-TW" altLang="en-US"/>
           </a:p>
@@ -3358,7 +3359,7 @@
           <a:p>
             <a:fld id="{088B5CA7-2AD3-4C1E-AA14-1E537B990F6F}" type="datetimeFigureOut">
               <a:rPr lang="zh-TW" altLang="en-US" smtClean="0"/>
-              <a:t>2024/8/8</a:t>
+              <a:t>2024/8/9</a:t>
             </a:fld>
             <a:endParaRPr lang="zh-TW" altLang="en-US"/>
           </a:p>
@@ -4367,6 +4368,101 @@
 </file>
 
 <file path=ppt/slides/slide12.xml><?xml version="1.0" encoding="utf-8"?>
+<p:sld xmlns:a="http://schemas.openxmlformats.org/drawingml/2006/main" xmlns:r="http://schemas.openxmlformats.org/officeDocument/2006/relationships" xmlns:p="http://schemas.openxmlformats.org/presentationml/2006/main">
+  <p:cSld>
+    <p:spTree>
+      <p:nvGrpSpPr>
+        <p:cNvPr id="1" name=""/>
+        <p:cNvGrpSpPr/>
+        <p:nvPr/>
+      </p:nvGrpSpPr>
+      <p:grpSpPr>
+        <a:xfrm>
+          <a:off x="0" y="0"/>
+          <a:ext cx="0" cy="0"/>
+          <a:chOff x="0" y="0"/>
+          <a:chExt cx="0" cy="0"/>
+        </a:xfrm>
+      </p:grpSpPr>
+      <p:pic>
+        <p:nvPicPr>
+          <p:cNvPr id="12" name="Chỗ dành sẵn cho Nội dung 11">
+            <a:extLst>
+              <a:ext uri="{FF2B5EF4-FFF2-40B4-BE49-F238E27FC236}">
+                <a16:creationId xmlns:a16="http://schemas.microsoft.com/office/drawing/2014/main" id="{5F299779-2F45-6DAD-CDF0-BA43CE47EA71}"/>
+              </a:ext>
+            </a:extLst>
+          </p:cNvPr>
+          <p:cNvPicPr>
+            <a:picLocks noGrp="1" noChangeAspect="1"/>
+          </p:cNvPicPr>
+          <p:nvPr>
+            <p:ph idx="1"/>
+          </p:nvPr>
+        </p:nvPicPr>
+        <p:blipFill>
+          <a:blip r:embed="rId2"/>
+          <a:stretch>
+            <a:fillRect/>
+          </a:stretch>
+        </p:blipFill>
+        <p:spPr>
+          <a:xfrm>
+            <a:off x="-402771" y="-402771"/>
+            <a:ext cx="12176360" cy="8610600"/>
+          </a:xfrm>
+        </p:spPr>
+      </p:pic>
+      <p:sp>
+        <p:nvSpPr>
+          <p:cNvPr id="8" name="Tiêu đề 1">
+            <a:extLst>
+              <a:ext uri="{FF2B5EF4-FFF2-40B4-BE49-F238E27FC236}">
+                <a16:creationId xmlns:a16="http://schemas.microsoft.com/office/drawing/2014/main" id="{4870E1C8-1927-C3F3-C48D-56072FA347E3}"/>
+              </a:ext>
+            </a:extLst>
+          </p:cNvPr>
+          <p:cNvSpPr>
+            <a:spLocks noGrp="1"/>
+          </p:cNvSpPr>
+          <p:nvPr>
+            <p:ph type="title"/>
+          </p:nvPr>
+        </p:nvSpPr>
+        <p:spPr>
+          <a:xfrm>
+            <a:off x="7157355" y="6220596"/>
+            <a:ext cx="5328559" cy="730519"/>
+          </a:xfrm>
+        </p:spPr>
+        <p:txBody>
+          <a:bodyPr>
+            <a:normAutofit/>
+          </a:bodyPr>
+          <a:lstStyle/>
+          <a:p>
+            <a:r>
+              <a:rPr lang="en-US" altLang="zh-TW" dirty="0"/>
+              <a:t>Proposed schematics</a:t>
+            </a:r>
+            <a:endParaRPr lang="en-US" dirty="0"/>
+          </a:p>
+        </p:txBody>
+      </p:sp>
+    </p:spTree>
+    <p:extLst>
+      <p:ext uri="{BB962C8B-B14F-4D97-AF65-F5344CB8AC3E}">
+        <p14:creationId xmlns:p14="http://schemas.microsoft.com/office/powerpoint/2010/main" val="3437513924"/>
+      </p:ext>
+    </p:extLst>
+  </p:cSld>
+  <p:clrMapOvr>
+    <a:masterClrMapping/>
+  </p:clrMapOvr>
+</p:sld>
+</file>
+
+<file path=ppt/slides/slide13.xml><?xml version="1.0" encoding="utf-8"?>
 <p:sld xmlns:a="http://schemas.openxmlformats.org/drawingml/2006/main" xmlns:r="http://schemas.openxmlformats.org/officeDocument/2006/relationships" xmlns:p="http://schemas.openxmlformats.org/presentationml/2006/main" show="0">
   <p:cSld>
     <p:spTree>
@@ -4561,115 +4657,6 @@
 </p:sld>
 </file>
 
-<file path=ppt/slides/slide13.xml><?xml version="1.0" encoding="utf-8"?>
-<p:sld xmlns:a="http://schemas.openxmlformats.org/drawingml/2006/main" xmlns:r="http://schemas.openxmlformats.org/officeDocument/2006/relationships" xmlns:p="http://schemas.openxmlformats.org/presentationml/2006/main">
-  <p:cSld>
-    <p:spTree>
-      <p:nvGrpSpPr>
-        <p:cNvPr id="1" name=""/>
-        <p:cNvGrpSpPr/>
-        <p:nvPr/>
-      </p:nvGrpSpPr>
-      <p:grpSpPr>
-        <a:xfrm>
-          <a:off x="0" y="0"/>
-          <a:ext cx="0" cy="0"/>
-          <a:chOff x="0" y="0"/>
-          <a:chExt cx="0" cy="0"/>
-        </a:xfrm>
-      </p:grpSpPr>
-      <p:sp>
-        <p:nvSpPr>
-          <p:cNvPr id="2" name="標題 1"/>
-          <p:cNvSpPr>
-            <a:spLocks noGrp="1"/>
-          </p:cNvSpPr>
-          <p:nvPr>
-            <p:ph type="title"/>
-          </p:nvPr>
-        </p:nvSpPr>
-        <p:spPr/>
-        <p:txBody>
-          <a:bodyPr/>
-          <a:lstStyle/>
-          <a:p>
-            <a:r>
-              <a:rPr lang="en-US" altLang="zh-TW" dirty="0"/>
-              <a:t>Future planning</a:t>
-            </a:r>
-            <a:endParaRPr lang="zh-TW" altLang="en-US" dirty="0"/>
-          </a:p>
-        </p:txBody>
-      </p:sp>
-      <p:sp>
-        <p:nvSpPr>
-          <p:cNvPr id="3" name="內容版面配置區 2"/>
-          <p:cNvSpPr>
-            <a:spLocks noGrp="1"/>
-          </p:cNvSpPr>
-          <p:nvPr>
-            <p:ph idx="1"/>
-          </p:nvPr>
-        </p:nvSpPr>
-        <p:spPr>
-          <a:xfrm>
-            <a:off x="838200" y="1502979"/>
-            <a:ext cx="10515600" cy="4673984"/>
-          </a:xfrm>
-        </p:spPr>
-        <p:txBody>
-          <a:bodyPr/>
-          <a:lstStyle/>
-          <a:p>
-            <a:r>
-              <a:rPr lang="en-US" altLang="zh-TW" dirty="0"/>
-              <a:t>Research more about current-injecting and measuring pattern and the feasibility of the proposed design</a:t>
-            </a:r>
-          </a:p>
-          <a:p>
-            <a:r>
-              <a:rPr lang="en-US" altLang="zh-TW" dirty="0"/>
-              <a:t>Can digital circuit simplify the control process?</a:t>
-            </a:r>
-          </a:p>
-          <a:p>
-            <a:r>
-              <a:rPr lang="en-US" altLang="zh-TW" dirty="0"/>
-              <a:t>Can we eliminate the need of </a:t>
-            </a:r>
-            <a:r>
-              <a:rPr lang="en-US" altLang="zh-TW" dirty="0" err="1"/>
-              <a:t>i</a:t>
-            </a:r>
-            <a:r>
-              <a:rPr lang="en-US" altLang="zh-TW" dirty="0"/>
-              <a:t>/o expander?</a:t>
-            </a:r>
-          </a:p>
-          <a:p>
-            <a:endParaRPr lang="en-US" altLang="zh-TW" dirty="0"/>
-          </a:p>
-          <a:p>
-            <a:endParaRPr lang="en-US" altLang="zh-TW" dirty="0"/>
-          </a:p>
-          <a:p>
-            <a:endParaRPr lang="en-US" altLang="zh-TW" dirty="0"/>
-          </a:p>
-        </p:txBody>
-      </p:sp>
-    </p:spTree>
-    <p:extLst>
-      <p:ext uri="{BB962C8B-B14F-4D97-AF65-F5344CB8AC3E}">
-        <p14:creationId xmlns:p14="http://schemas.microsoft.com/office/powerpoint/2010/main" val="2036962225"/>
-      </p:ext>
-    </p:extLst>
-  </p:cSld>
-  <p:clrMapOvr>
-    <a:masterClrMapping/>
-  </p:clrMapOvr>
-</p:sld>
-</file>
-
 <file path=ppt/slides/slide14.xml><?xml version="1.0" encoding="utf-8"?>
 <p:sld xmlns:a="http://schemas.openxmlformats.org/drawingml/2006/main" xmlns:r="http://schemas.openxmlformats.org/officeDocument/2006/relationships" xmlns:p="http://schemas.openxmlformats.org/presentationml/2006/main">
   <p:cSld>
@@ -4704,6 +4691,89 @@
           <a:p>
             <a:r>
               <a:rPr lang="en-US" altLang="zh-TW" dirty="0"/>
+              <a:t>Future planning</a:t>
+            </a:r>
+            <a:endParaRPr lang="zh-TW" altLang="en-US" dirty="0"/>
+          </a:p>
+        </p:txBody>
+      </p:sp>
+      <p:sp>
+        <p:nvSpPr>
+          <p:cNvPr id="3" name="內容版面配置區 2"/>
+          <p:cNvSpPr>
+            <a:spLocks noGrp="1"/>
+          </p:cNvSpPr>
+          <p:nvPr>
+            <p:ph idx="1"/>
+          </p:nvPr>
+        </p:nvSpPr>
+        <p:spPr>
+          <a:xfrm>
+            <a:off x="838200" y="1502979"/>
+            <a:ext cx="10515600" cy="4673984"/>
+          </a:xfrm>
+        </p:spPr>
+        <p:txBody>
+          <a:bodyPr/>
+          <a:lstStyle/>
+          <a:p>
+            <a:endParaRPr lang="en-US" altLang="zh-TW" dirty="0"/>
+          </a:p>
+          <a:p>
+            <a:endParaRPr lang="en-US" altLang="zh-TW" dirty="0"/>
+          </a:p>
+          <a:p>
+            <a:endParaRPr lang="en-US" altLang="zh-TW" dirty="0"/>
+          </a:p>
+        </p:txBody>
+      </p:sp>
+    </p:spTree>
+    <p:extLst>
+      <p:ext uri="{BB962C8B-B14F-4D97-AF65-F5344CB8AC3E}">
+        <p14:creationId xmlns:p14="http://schemas.microsoft.com/office/powerpoint/2010/main" val="2036962225"/>
+      </p:ext>
+    </p:extLst>
+  </p:cSld>
+  <p:clrMapOvr>
+    <a:masterClrMapping/>
+  </p:clrMapOvr>
+</p:sld>
+</file>
+
+<file path=ppt/slides/slide15.xml><?xml version="1.0" encoding="utf-8"?>
+<p:sld xmlns:a="http://schemas.openxmlformats.org/drawingml/2006/main" xmlns:r="http://schemas.openxmlformats.org/officeDocument/2006/relationships" xmlns:p="http://schemas.openxmlformats.org/presentationml/2006/main">
+  <p:cSld>
+    <p:spTree>
+      <p:nvGrpSpPr>
+        <p:cNvPr id="1" name=""/>
+        <p:cNvGrpSpPr/>
+        <p:nvPr/>
+      </p:nvGrpSpPr>
+      <p:grpSpPr>
+        <a:xfrm>
+          <a:off x="0" y="0"/>
+          <a:ext cx="0" cy="0"/>
+          <a:chOff x="0" y="0"/>
+          <a:chExt cx="0" cy="0"/>
+        </a:xfrm>
+      </p:grpSpPr>
+      <p:sp>
+        <p:nvSpPr>
+          <p:cNvPr id="2" name="標題 1"/>
+          <p:cNvSpPr>
+            <a:spLocks noGrp="1"/>
+          </p:cNvSpPr>
+          <p:nvPr>
+            <p:ph type="title"/>
+          </p:nvPr>
+        </p:nvSpPr>
+        <p:spPr/>
+        <p:txBody>
+          <a:bodyPr/>
+          <a:lstStyle/>
+          <a:p>
+            <a:r>
+              <a:rPr lang="en-US" altLang="zh-TW" dirty="0"/>
               <a:t>Reference</a:t>
             </a:r>
             <a:endParaRPr lang="zh-TW" altLang="en-US" dirty="0"/>
@@ -4809,7 +4879,7 @@
 </p:sld>
 </file>
 
-<file path=ppt/slides/slide15.xml><?xml version="1.0" encoding="utf-8"?>
+<file path=ppt/slides/slide16.xml><?xml version="1.0" encoding="utf-8"?>
 <p:sld xmlns:a="http://schemas.openxmlformats.org/drawingml/2006/main" xmlns:r="http://schemas.openxmlformats.org/officeDocument/2006/relationships" xmlns:p="http://schemas.openxmlformats.org/presentationml/2006/main">
   <p:cSld>
     <p:spTree>
@@ -5091,12 +5161,14 @@
         </p:nvSpPr>
         <p:spPr>
           <a:xfrm>
-            <a:off x="470555" y="316934"/>
-            <a:ext cx="11353800" cy="1325563"/>
+            <a:off x="470555" y="316935"/>
+            <a:ext cx="11353800" cy="760752"/>
           </a:xfrm>
         </p:spPr>
         <p:txBody>
-          <a:bodyPr/>
+          <a:bodyPr>
+            <a:normAutofit fontScale="90000"/>
+          </a:bodyPr>
           <a:lstStyle/>
           <a:p>
             <a:r>
@@ -5125,8 +5197,8 @@
         </p:blipFill>
         <p:spPr>
           <a:xfrm>
-            <a:off x="0" y="2047923"/>
-            <a:ext cx="5577893" cy="3781377"/>
+            <a:off x="0" y="1642497"/>
+            <a:ext cx="4572000" cy="3099460"/>
           </a:xfrm>
           <a:prstGeom prst="rect">
             <a:avLst/>
@@ -5149,8 +5221,8 @@
             </p:nvSpPr>
             <p:spPr>
               <a:xfrm>
-                <a:off x="5912105" y="2686615"/>
-                <a:ext cx="6005312" cy="2246769"/>
+                <a:off x="401978" y="5053971"/>
+                <a:ext cx="10046352" cy="1938992"/>
               </a:xfrm>
               <a:prstGeom prst="rect">
                 <a:avLst/>
@@ -5431,8 +5503,8 @@
             </p:nvSpPr>
             <p:spPr>
               <a:xfrm>
-                <a:off x="5912105" y="2686615"/>
-                <a:ext cx="6005312" cy="2246769"/>
+                <a:off x="401978" y="5053971"/>
+                <a:ext cx="10046352" cy="1938992"/>
               </a:xfrm>
               <a:prstGeom prst="rect">
                 <a:avLst/>
@@ -5440,7 +5512,7 @@
               <a:blipFill>
                 <a:blip r:embed="rId3"/>
                 <a:stretch>
-                  <a:fillRect l="-1117" t="-1630" r="-1523"/>
+                  <a:fillRect l="-667" t="-1572"/>
                 </a:stretch>
               </a:blipFill>
             </p:spPr>
@@ -5459,6 +5531,35 @@
           </p:sp>
         </mc:Fallback>
       </mc:AlternateContent>
+      <p:pic>
+        <p:nvPicPr>
+          <p:cNvPr id="5" name="圖片 4">
+            <a:extLst>
+              <a:ext uri="{FF2B5EF4-FFF2-40B4-BE49-F238E27FC236}">
+                <a16:creationId xmlns:a16="http://schemas.microsoft.com/office/drawing/2014/main" id="{0D962F7C-02EF-7825-B158-49B931FE99B8}"/>
+              </a:ext>
+            </a:extLst>
+          </p:cNvPr>
+          <p:cNvPicPr>
+            <a:picLocks noChangeAspect="1"/>
+          </p:cNvPicPr>
+          <p:nvPr/>
+        </p:nvPicPr>
+        <p:blipFill rotWithShape="1">
+          <a:blip r:embed="rId4"/>
+          <a:srcRect l="1159"/>
+          <a:stretch/>
+        </p:blipFill>
+        <p:spPr>
+          <a:xfrm>
+            <a:off x="4492645" y="943909"/>
+            <a:ext cx="7699355" cy="4167214"/>
+          </a:xfrm>
+          <a:prstGeom prst="rect">
+            <a:avLst/>
+          </a:prstGeom>
+        </p:spPr>
+      </p:pic>
     </p:spTree>
     <p:extLst>
       <p:ext uri="{BB962C8B-B14F-4D97-AF65-F5344CB8AC3E}">
@@ -9332,7 +9433,7 @@
           <a:p>
             <a:r>
               <a:rPr lang="en-US" dirty="0"/>
-              <a:t>Proposed design</a:t>
+              <a:t>Proposed design: 16-electrode EIT system</a:t>
             </a:r>
           </a:p>
         </p:txBody>
@@ -9351,7 +9452,7 @@
         </p:nvSpPr>
         <p:spPr>
           <a:xfrm>
-            <a:off x="539815" y="4900251"/>
+            <a:off x="539815" y="5411879"/>
             <a:ext cx="5110212" cy="1015663"/>
           </a:xfrm>
           <a:prstGeom prst="rect">
@@ -9406,7 +9507,7 @@
         </p:nvSpPr>
         <p:spPr>
           <a:xfrm>
-            <a:off x="6541975" y="4900251"/>
+            <a:off x="6541975" y="5411879"/>
             <a:ext cx="5110212" cy="1323439"/>
           </a:xfrm>
           <a:prstGeom prst="rect">
@@ -9475,7 +9576,7 @@
         </p:blipFill>
         <p:spPr>
           <a:xfrm>
-            <a:off x="0" y="1096091"/>
+            <a:off x="0" y="1607719"/>
             <a:ext cx="6100225" cy="3617219"/>
           </a:xfrm>
           <a:prstGeom prst="rect">
@@ -9511,7 +9612,7 @@
         </p:blipFill>
         <p:spPr>
           <a:xfrm>
-            <a:off x="6000920" y="1051034"/>
+            <a:off x="6000920" y="1562662"/>
             <a:ext cx="6193708" cy="3662276"/>
           </a:xfrm>
           <a:prstGeom prst="rect">
@@ -9533,7 +9634,7 @@
         </p:nvSpPr>
         <p:spPr>
           <a:xfrm>
-            <a:off x="6000920" y="651641"/>
+            <a:off x="6000920" y="1163269"/>
             <a:ext cx="6191080" cy="4248610"/>
           </a:xfrm>
           <a:prstGeom prst="rect">

</xml_diff>